<commit_message>
cap nhat bao cao va slide
</commit_message>
<xml_diff>
--- a/documents/DoAn_NguyenQuocDat_2018600273.pptx
+++ b/documents/DoAn_NguyenQuocDat_2018600273.pptx
@@ -280,7 +280,7 @@
       <p15:sldGuideLst xmlns:p15="http://schemas.microsoft.com/office/powerpoint/2012/main"/>
     </p:ext>
     <p:ext uri="http://customooxmlschemas.google.com/">
-      <go:slidesCustomData xmlns="" xmlns:mc="http://schemas.openxmlformats.org/markup-compatibility/2006" xmlns:mv="urn:schemas-microsoft-com:mac:vml" xmlns:c="http://schemas.openxmlformats.org/drawingml/2006/chart" xmlns:dgm="http://schemas.openxmlformats.org/drawingml/2006/diagram" xmlns:o="urn:schemas-microsoft-com:office:office" xmlns:v="urn:schemas-microsoft-com:vml" xmlns:pvml="urn:schemas-microsoft-com:office:powerpoint" xmlns:com="http://schemas.openxmlformats.org/drawingml/2006/compatibility" xmlns:p14="http://schemas.microsoft.com/office/powerpoint/2010/main" xmlns:p15="http://schemas.microsoft.com/office/powerpoint/2012/main" xmlns:ahyp="http://schemas.microsoft.com/office/drawing/2018/hyperlinkcolor" xmlns:go="http://customooxmlschemas.google.com/" r:id="rId30" roundtripDataSignature="AMtx7miF0ih9+Bluf2tKMSZ3rr4UasTu3Q=="/>
+      <go:slidesCustomData xmlns:go="http://customooxmlschemas.google.com/" xmlns:ahyp="http://schemas.microsoft.com/office/drawing/2018/hyperlinkcolor" xmlns:p15="http://schemas.microsoft.com/office/powerpoint/2012/main" xmlns:p14="http://schemas.microsoft.com/office/powerpoint/2010/main" xmlns:com="http://schemas.openxmlformats.org/drawingml/2006/compatibility" xmlns:pvml="urn:schemas-microsoft-com:office:powerpoint" xmlns:v="urn:schemas-microsoft-com:vml" xmlns:o="urn:schemas-microsoft-com:office:office" xmlns:dgm="http://schemas.openxmlformats.org/drawingml/2006/diagram" xmlns:c="http://schemas.openxmlformats.org/drawingml/2006/chart" xmlns:mv="urn:schemas-microsoft-com:mac:vml" xmlns:mc="http://schemas.openxmlformats.org/markup-compatibility/2006" xmlns="" r:id="rId30" roundtripDataSignature="AMtx7miF0ih9+Bluf2tKMSZ3rr4UasTu3Q=="/>
     </p:ext>
   </p:extLst>
 </p:presentation>
@@ -21030,8 +21030,23 @@
                 </a:solidFill>
                 <a:latin typeface="+mn-lt"/>
               </a:rPr>
-              <a:t>nhân sự đóng vai trò quản trị và ảnh hưởng nhiều đến sự thành công của một tổ chức.</a:t>
+              <a:t>nhân sự đóng vai trò quản trị và ảnh hưởng nhiều đến sự thành công của một tổ </a:t>
             </a:r>
+            <a:r>
+              <a:rPr lang="vi-VN" sz="2400">
+                <a:solidFill>
+                  <a:schemeClr val="bg1"/>
+                </a:solidFill>
+                <a:latin typeface="+mn-lt"/>
+              </a:rPr>
+              <a:t>chức.</a:t>
+            </a:r>
+            <a:endParaRPr lang="vi-VN" sz="2400" dirty="0">
+              <a:solidFill>
+                <a:schemeClr val="bg1"/>
+              </a:solidFill>
+              <a:latin typeface="+mn-lt"/>
+            </a:endParaRPr>
           </a:p>
         </p:txBody>
       </p:sp>
@@ -22034,7 +22049,25 @@
                 </a:solidFill>
                 <a:latin typeface="+mn-lt"/>
               </a:rPr>
-              <a:t>	- Thiết lập cơ cấu tổ chức, vị trí </a:t>
+              <a:t>	- </a:t>
+            </a:r>
+            <a:r>
+              <a:rPr lang="vi-VN" sz="2400">
+                <a:solidFill>
+                  <a:schemeClr val="bg1"/>
+                </a:solidFill>
+                <a:latin typeface="+mn-lt"/>
+              </a:rPr>
+              <a:t>Thiết lập người dùng, vai trò, </a:t>
+            </a:r>
+            <a:r>
+              <a:rPr lang="vi-VN" sz="2400" dirty="0">
+                <a:solidFill>
+                  <a:schemeClr val="bg1"/>
+                </a:solidFill>
+                <a:latin typeface="+mn-lt"/>
+              </a:rPr>
+              <a:t>cơ cấu tổ chức, vị trí </a:t>
             </a:r>
             <a:r>
               <a:rPr lang="vi-VN" sz="2400">
@@ -22910,10 +22943,10 @@
       </p:sp>
       <p:pic>
         <p:nvPicPr>
-          <p:cNvPr id="7" name="Picture 6" descr="Diagram, schematic&#10;&#10;Description automatically generated">
+          <p:cNvPr id="6" name="Picture 5">
             <a:extLst>
               <a:ext uri="{FF2B5EF4-FFF2-40B4-BE49-F238E27FC236}">
-                <a16:creationId xmlns:a16="http://schemas.microsoft.com/office/drawing/2014/main" id="{A7D2195C-CFBB-5E90-E744-139697281F05}"/>
+                <a16:creationId xmlns:a16="http://schemas.microsoft.com/office/drawing/2014/main" id="{AE3A988D-EBA6-3C63-0DE7-36CBA385231A}"/>
               </a:ext>
             </a:extLst>
           </p:cNvPr>
@@ -22930,8 +22963,8 @@
         </p:blipFill>
         <p:spPr>
           <a:xfrm>
-            <a:off x="2194461" y="1828800"/>
-            <a:ext cx="7803077" cy="4022593"/>
+            <a:off x="3054858" y="1814131"/>
+            <a:ext cx="6210300" cy="4162425"/>
           </a:xfrm>
           <a:prstGeom prst="rect">
             <a:avLst/>

</xml_diff>